<commit_message>
Continued working on Tokenization for W10S1.
</commit_message>
<xml_diff>
--- a/W9/W9S3/W9S3.pptx
+++ b/W9/W9S3/W9S3.pptx
@@ -321,7 +321,7 @@
   <pc:docChgLst>
     <pc:chgData name="Matthieu De Mari" userId="dfb708c9-d8dc-439f-9a3b-c772bf4a311c" providerId="ADAL" clId="{1888DEAD-E307-4CA6-AFF5-49DFF9FCD3C3}"/>
     <pc:docChg chg="undo redo custSel addSld delSld modSld sldOrd addSection delSection modSection">
-      <pc:chgData name="Matthieu De Mari" userId="dfb708c9-d8dc-439f-9a3b-c772bf4a311c" providerId="ADAL" clId="{1888DEAD-E307-4CA6-AFF5-49DFF9FCD3C3}" dt="2023-03-21T06:04:29.772" v="12996" actId="47"/>
+      <pc:chgData name="Matthieu De Mari" userId="dfb708c9-d8dc-439f-9a3b-c772bf4a311c" providerId="ADAL" clId="{1888DEAD-E307-4CA6-AFF5-49DFF9FCD3C3}" dt="2023-03-21T06:10:08.878" v="13041" actId="20577"/>
       <pc:docMkLst>
         <pc:docMk/>
       </pc:docMkLst>
@@ -1908,7 +1908,7 @@
         </pc:sldMkLst>
       </pc:sldChg>
       <pc:sldChg chg="delSp modSp new mod modClrScheme chgLayout">
-        <pc:chgData name="Matthieu De Mari" userId="dfb708c9-d8dc-439f-9a3b-c772bf4a311c" providerId="ADAL" clId="{1888DEAD-E307-4CA6-AFF5-49DFF9FCD3C3}" dt="2023-03-21T05:57:53.768" v="12562" actId="20577"/>
+        <pc:chgData name="Matthieu De Mari" userId="dfb708c9-d8dc-439f-9a3b-c772bf4a311c" providerId="ADAL" clId="{1888DEAD-E307-4CA6-AFF5-49DFF9FCD3C3}" dt="2023-03-21T06:10:08.878" v="13041" actId="20577"/>
         <pc:sldMkLst>
           <pc:docMk/>
           <pc:sldMk cId="669465544" sldId="433"/>
@@ -1922,7 +1922,7 @@
           </ac:spMkLst>
         </pc:spChg>
         <pc:spChg chg="mod ord">
-          <ac:chgData name="Matthieu De Mari" userId="dfb708c9-d8dc-439f-9a3b-c772bf4a311c" providerId="ADAL" clId="{1888DEAD-E307-4CA6-AFF5-49DFF9FCD3C3}" dt="2023-03-21T05:57:53.768" v="12562" actId="20577"/>
+          <ac:chgData name="Matthieu De Mari" userId="dfb708c9-d8dc-439f-9a3b-c772bf4a311c" providerId="ADAL" clId="{1888DEAD-E307-4CA6-AFF5-49DFF9FCD3C3}" dt="2023-03-21T06:10:08.878" v="13041" actId="20577"/>
           <ac:spMkLst>
             <pc:docMk/>
             <pc:sldMk cId="669465544" sldId="433"/>
@@ -25572,8 +25572,13 @@
             </a:pPr>
             <a:r>
               <a:rPr lang="en-GB" dirty="0"/>
-              <a:t>Let us call it a day for now.</a:t>
-            </a:r>
+              <a:t>Let us call it a day for now. On the </a:t>
+            </a:r>
+            <a:r>
+              <a:rPr lang="en-GB"/>
+              <a:t>next lecture,</a:t>
+            </a:r>
+            <a:endParaRPr lang="en-GB" dirty="0"/>
           </a:p>
           <a:p>
             <a:r>

</xml_diff>

<commit_message>
Added Practice to W9S3 - Producing a Tokenizer v1.0, v1.1 and v1.2 (solution for v1.2 is missing)
</commit_message>
<xml_diff>
--- a/W9/W9S3/W9S3.pptx
+++ b/W9/W9S3/W9S3.pptx
@@ -5,7 +5,7 @@
     <p:sldMasterId id="2147483648" r:id="rId1"/>
   </p:sldMasterIdLst>
   <p:notesMasterIdLst>
-    <p:notesMasterId r:id="rId78"/>
+    <p:notesMasterId r:id="rId81"/>
   </p:notesMasterIdLst>
   <p:sldIdLst>
     <p:sldId id="377" r:id="rId2"/>
@@ -84,6 +84,9 @@
     <p:sldId id="458" r:id="rId75"/>
     <p:sldId id="456" r:id="rId76"/>
     <p:sldId id="460" r:id="rId77"/>
+    <p:sldId id="469" r:id="rId78"/>
+    <p:sldId id="470" r:id="rId79"/>
+    <p:sldId id="471" r:id="rId80"/>
   </p:sldIdLst>
   <p:sldSz cx="12192000" cy="6858000"/>
   <p:notesSz cx="6858000" cy="9144000"/>
@@ -313,6 +316,13 @@
             <p14:sldId id="460"/>
           </p14:sldIdLst>
         </p14:section>
+        <p14:section name="Coding Practice" id="{54977B6B-05A2-4074-BCC4-C682F7EF209C}">
+          <p14:sldIdLst>
+            <p14:sldId id="469"/>
+            <p14:sldId id="470"/>
+            <p14:sldId id="471"/>
+          </p14:sldIdLst>
+        </p14:section>
       </p14:sectionLst>
     </p:ext>
     <p:ext uri="{EFAFB233-063F-42B5-8137-9DF3F51BA10A}">
@@ -341,7 +351,7 @@
   <pc:docChgLst>
     <pc:chgData name="Matthieu De Mari" userId="dfb708c9-d8dc-439f-9a3b-c772bf4a311c" providerId="ADAL" clId="{1888DEAD-E307-4CA6-AFF5-49DFF9FCD3C3}"/>
     <pc:docChg chg="undo redo custSel addSld delSld modSld sldOrd addSection delSection modSection">
-      <pc:chgData name="Matthieu De Mari" userId="dfb708c9-d8dc-439f-9a3b-c772bf4a311c" providerId="ADAL" clId="{1888DEAD-E307-4CA6-AFF5-49DFF9FCD3C3}" dt="2023-03-22T07:41:07.783" v="16059" actId="20577"/>
+      <pc:chgData name="Matthieu De Mari" userId="dfb708c9-d8dc-439f-9a3b-c772bf4a311c" providerId="ADAL" clId="{1888DEAD-E307-4CA6-AFF5-49DFF9FCD3C3}" dt="2023-03-23T06:04:50.004" v="18554" actId="20577"/>
       <pc:docMkLst>
         <pc:docMk/>
       </pc:docMkLst>
@@ -1097,7 +1107,7 @@
         </pc:sldMkLst>
       </pc:sldChg>
       <pc:sldChg chg="modSp new mod">
-        <pc:chgData name="Matthieu De Mari" userId="dfb708c9-d8dc-439f-9a3b-c772bf4a311c" providerId="ADAL" clId="{1888DEAD-E307-4CA6-AFF5-49DFF9FCD3C3}" dt="2023-03-20T11:17:55.593" v="6342" actId="20577"/>
+        <pc:chgData name="Matthieu De Mari" userId="dfb708c9-d8dc-439f-9a3b-c772bf4a311c" providerId="ADAL" clId="{1888DEAD-E307-4CA6-AFF5-49DFF9FCD3C3}" dt="2023-03-23T05:47:09.414" v="16074" actId="20577"/>
         <pc:sldMkLst>
           <pc:docMk/>
           <pc:sldMk cId="2277689196" sldId="410"/>
@@ -1111,7 +1121,7 @@
           </ac:spMkLst>
         </pc:spChg>
         <pc:spChg chg="mod">
-          <ac:chgData name="Matthieu De Mari" userId="dfb708c9-d8dc-439f-9a3b-c772bf4a311c" providerId="ADAL" clId="{1888DEAD-E307-4CA6-AFF5-49DFF9FCD3C3}" dt="2023-03-20T11:17:55.593" v="6342" actId="20577"/>
+          <ac:chgData name="Matthieu De Mari" userId="dfb708c9-d8dc-439f-9a3b-c772bf4a311c" providerId="ADAL" clId="{1888DEAD-E307-4CA6-AFF5-49DFF9FCD3C3}" dt="2023-03-23T05:47:09.414" v="16074" actId="20577"/>
           <ac:spMkLst>
             <pc:docMk/>
             <pc:sldMk cId="2277689196" sldId="410"/>
@@ -2959,6 +2969,59 @@
             <ac:spMk id="4" creationId="{5D0D450B-C201-FDB7-239F-6DE0626BCB23}"/>
           </ac:spMkLst>
         </pc:spChg>
+      </pc:sldChg>
+      <pc:sldChg chg="modSp new mod">
+        <pc:chgData name="Matthieu De Mari" userId="dfb708c9-d8dc-439f-9a3b-c772bf4a311c" providerId="ADAL" clId="{1888DEAD-E307-4CA6-AFF5-49DFF9FCD3C3}" dt="2023-03-23T05:59:07.378" v="17780" actId="113"/>
+        <pc:sldMkLst>
+          <pc:docMk/>
+          <pc:sldMk cId="2655895668" sldId="469"/>
+        </pc:sldMkLst>
+        <pc:spChg chg="mod">
+          <ac:chgData name="Matthieu De Mari" userId="dfb708c9-d8dc-439f-9a3b-c772bf4a311c" providerId="ADAL" clId="{1888DEAD-E307-4CA6-AFF5-49DFF9FCD3C3}" dt="2023-03-23T05:51:48.914" v="16129" actId="20577"/>
+          <ac:spMkLst>
+            <pc:docMk/>
+            <pc:sldMk cId="2655895668" sldId="469"/>
+            <ac:spMk id="2" creationId="{5CA32CAE-C072-3422-F222-D598990D8902}"/>
+          </ac:spMkLst>
+        </pc:spChg>
+        <pc:spChg chg="mod">
+          <ac:chgData name="Matthieu De Mari" userId="dfb708c9-d8dc-439f-9a3b-c772bf4a311c" providerId="ADAL" clId="{1888DEAD-E307-4CA6-AFF5-49DFF9FCD3C3}" dt="2023-03-23T05:59:07.378" v="17780" actId="113"/>
+          <ac:spMkLst>
+            <pc:docMk/>
+            <pc:sldMk cId="2655895668" sldId="469"/>
+            <ac:spMk id="3" creationId="{3E807926-5A85-2B0A-E0A9-3D6A993803D9}"/>
+          </ac:spMkLst>
+        </pc:spChg>
+      </pc:sldChg>
+      <pc:sldChg chg="modSp add mod">
+        <pc:chgData name="Matthieu De Mari" userId="dfb708c9-d8dc-439f-9a3b-c772bf4a311c" providerId="ADAL" clId="{1888DEAD-E307-4CA6-AFF5-49DFF9FCD3C3}" dt="2023-03-23T06:04:50.004" v="18554" actId="20577"/>
+        <pc:sldMkLst>
+          <pc:docMk/>
+          <pc:sldMk cId="127443025" sldId="470"/>
+        </pc:sldMkLst>
+        <pc:spChg chg="mod">
+          <ac:chgData name="Matthieu De Mari" userId="dfb708c9-d8dc-439f-9a3b-c772bf4a311c" providerId="ADAL" clId="{1888DEAD-E307-4CA6-AFF5-49DFF9FCD3C3}" dt="2023-03-23T06:01:12.134" v="17837" actId="20577"/>
+          <ac:spMkLst>
+            <pc:docMk/>
+            <pc:sldMk cId="127443025" sldId="470"/>
+            <ac:spMk id="2" creationId="{5CA32CAE-C072-3422-F222-D598990D8902}"/>
+          </ac:spMkLst>
+        </pc:spChg>
+        <pc:spChg chg="mod">
+          <ac:chgData name="Matthieu De Mari" userId="dfb708c9-d8dc-439f-9a3b-c772bf4a311c" providerId="ADAL" clId="{1888DEAD-E307-4CA6-AFF5-49DFF9FCD3C3}" dt="2023-03-23T06:04:50.004" v="18554" actId="20577"/>
+          <ac:spMkLst>
+            <pc:docMk/>
+            <pc:sldMk cId="127443025" sldId="470"/>
+            <ac:spMk id="3" creationId="{3E807926-5A85-2B0A-E0A9-3D6A993803D9}"/>
+          </ac:spMkLst>
+        </pc:spChg>
+      </pc:sldChg>
+      <pc:sldChg chg="add">
+        <pc:chgData name="Matthieu De Mari" userId="dfb708c9-d8dc-439f-9a3b-c772bf4a311c" providerId="ADAL" clId="{1888DEAD-E307-4CA6-AFF5-49DFF9FCD3C3}" dt="2023-03-23T06:01:08.023" v="17833" actId="2890"/>
+        <pc:sldMkLst>
+          <pc:docMk/>
+          <pc:sldMk cId="2694874023" sldId="471"/>
+        </pc:sldMkLst>
       </pc:sldChg>
     </pc:docChg>
   </pc:docChgLst>
@@ -13591,7 +13654,7 @@
           <a:p>
             <a:fld id="{98CFC6A4-B085-437B-8084-693BEB2A32DE}" type="datetimeFigureOut">
               <a:rPr lang="en-SG" smtClean="0"/>
-              <a:t>22/3/2023</a:t>
+              <a:t>23/3/2023</a:t>
             </a:fld>
             <a:endParaRPr lang="en-SG"/>
           </a:p>
@@ -14008,7 +14071,7 @@
           <a:p>
             <a:fld id="{AB35F6B0-D468-4997-9CE3-CF2A1AE5E3F9}" type="datetimeFigureOut">
               <a:rPr lang="en-SG" smtClean="0"/>
-              <a:t>22/3/2023</a:t>
+              <a:t>23/3/2023</a:t>
             </a:fld>
             <a:endParaRPr lang="en-SG"/>
           </a:p>
@@ -14208,7 +14271,7 @@
           <a:p>
             <a:fld id="{AB35F6B0-D468-4997-9CE3-CF2A1AE5E3F9}" type="datetimeFigureOut">
               <a:rPr lang="en-SG" smtClean="0"/>
-              <a:t>22/3/2023</a:t>
+              <a:t>23/3/2023</a:t>
             </a:fld>
             <a:endParaRPr lang="en-SG"/>
           </a:p>
@@ -14418,7 +14481,7 @@
           <a:p>
             <a:fld id="{AB35F6B0-D468-4997-9CE3-CF2A1AE5E3F9}" type="datetimeFigureOut">
               <a:rPr lang="en-SG" smtClean="0"/>
-              <a:t>22/3/2023</a:t>
+              <a:t>23/3/2023</a:t>
             </a:fld>
             <a:endParaRPr lang="en-SG"/>
           </a:p>
@@ -14618,7 +14681,7 @@
           <a:p>
             <a:fld id="{AB35F6B0-D468-4997-9CE3-CF2A1AE5E3F9}" type="datetimeFigureOut">
               <a:rPr lang="en-SG" smtClean="0"/>
-              <a:t>22/3/2023</a:t>
+              <a:t>23/3/2023</a:t>
             </a:fld>
             <a:endParaRPr lang="en-SG"/>
           </a:p>
@@ -14894,7 +14957,7 @@
           <a:p>
             <a:fld id="{AB35F6B0-D468-4997-9CE3-CF2A1AE5E3F9}" type="datetimeFigureOut">
               <a:rPr lang="en-SG" smtClean="0"/>
-              <a:t>22/3/2023</a:t>
+              <a:t>23/3/2023</a:t>
             </a:fld>
             <a:endParaRPr lang="en-SG"/>
           </a:p>
@@ -15162,7 +15225,7 @@
           <a:p>
             <a:fld id="{AB35F6B0-D468-4997-9CE3-CF2A1AE5E3F9}" type="datetimeFigureOut">
               <a:rPr lang="en-SG" smtClean="0"/>
-              <a:t>22/3/2023</a:t>
+              <a:t>23/3/2023</a:t>
             </a:fld>
             <a:endParaRPr lang="en-SG"/>
           </a:p>
@@ -15577,7 +15640,7 @@
           <a:p>
             <a:fld id="{AB35F6B0-D468-4997-9CE3-CF2A1AE5E3F9}" type="datetimeFigureOut">
               <a:rPr lang="en-SG" smtClean="0"/>
-              <a:t>22/3/2023</a:t>
+              <a:t>23/3/2023</a:t>
             </a:fld>
             <a:endParaRPr lang="en-SG"/>
           </a:p>
@@ -15719,7 +15782,7 @@
           <a:p>
             <a:fld id="{AB35F6B0-D468-4997-9CE3-CF2A1AE5E3F9}" type="datetimeFigureOut">
               <a:rPr lang="en-SG" smtClean="0"/>
-              <a:t>22/3/2023</a:t>
+              <a:t>23/3/2023</a:t>
             </a:fld>
             <a:endParaRPr lang="en-SG"/>
           </a:p>
@@ -15832,7 +15895,7 @@
           <a:p>
             <a:fld id="{AB35F6B0-D468-4997-9CE3-CF2A1AE5E3F9}" type="datetimeFigureOut">
               <a:rPr lang="en-SG" smtClean="0"/>
-              <a:t>22/3/2023</a:t>
+              <a:t>23/3/2023</a:t>
             </a:fld>
             <a:endParaRPr lang="en-SG"/>
           </a:p>
@@ -16145,7 +16208,7 @@
           <a:p>
             <a:fld id="{AB35F6B0-D468-4997-9CE3-CF2A1AE5E3F9}" type="datetimeFigureOut">
               <a:rPr lang="en-SG" smtClean="0"/>
-              <a:t>22/3/2023</a:t>
+              <a:t>23/3/2023</a:t>
             </a:fld>
             <a:endParaRPr lang="en-SG"/>
           </a:p>
@@ -16434,7 +16497,7 @@
           <a:p>
             <a:fld id="{AB35F6B0-D468-4997-9CE3-CF2A1AE5E3F9}" type="datetimeFigureOut">
               <a:rPr lang="en-SG" smtClean="0"/>
-              <a:t>22/3/2023</a:t>
+              <a:t>23/3/2023</a:t>
             </a:fld>
             <a:endParaRPr lang="en-SG"/>
           </a:p>
@@ -16677,7 +16740,7 @@
           <a:p>
             <a:fld id="{AB35F6B0-D468-4997-9CE3-CF2A1AE5E3F9}" type="datetimeFigureOut">
               <a:rPr lang="en-SG" smtClean="0"/>
-              <a:t>22/3/2023</a:t>
+              <a:t>23/3/2023</a:t>
             </a:fld>
             <a:endParaRPr lang="en-SG"/>
           </a:p>
@@ -17402,28 +17465,32 @@
           </a:p>
           <a:p>
             <a:r>
-              <a:rPr lang="en-GB" dirty="0"/>
-              <a:t>White spaces between all tokens, so that we can use a simple split operation using whitespaces and \n symbols as separators, to produce all the substrings to be analysed and used as tokens.</a:t>
+              <a:rPr lang="en-GB" b="1" dirty="0"/>
+              <a:t>White spaces between all tokens</a:t>
+            </a:r>
+            <a:r>
+              <a:rPr lang="en-GB" dirty="0"/>
+              <a:t>, so that we can use a simple split operation using whitespaces and \n symbols as separators, to produce all the substrings to be analysed and used as tokens.</a:t>
             </a:r>
             <a:br>
               <a:rPr lang="en-GB" dirty="0"/>
             </a:br>
             <a:r>
-              <a:rPr lang="en-GB" dirty="0"/>
+              <a:rPr lang="en-GB" b="1" dirty="0"/>
               <a:t>We will eventually relax this constraint later on.</a:t>
             </a:r>
           </a:p>
           <a:p>
             <a:r>
               <a:rPr lang="en-GB" dirty="0"/>
-              <a:t>Start with basic tokens, e.g. keywords only</a:t>
+              <a:t>Start with basic tokens, e.g. keywords only.</a:t>
             </a:r>
             <a:br>
               <a:rPr lang="en-GB" dirty="0"/>
             </a:br>
             <a:r>
               <a:rPr lang="en-GB" dirty="0"/>
-              <a:t>Later on, we will add new token types, starting with simple characters/operators (+ * - / ;), and then identifiers/literals.</a:t>
+              <a:t>Later on, we will add new token types, starting with simple punctuations/operators (+ * - / ;), and then identifiers/literals.</a:t>
             </a:r>
           </a:p>
           <a:p>
@@ -28653,6 +28720,559 @@
     <p:extLst>
       <p:ext uri="{BB962C8B-B14F-4D97-AF65-F5344CB8AC3E}">
         <p14:creationId xmlns:p14="http://schemas.microsoft.com/office/powerpoint/2010/main" val="2071137550"/>
+      </p:ext>
+    </p:extLst>
+  </p:cSld>
+  <p:clrMapOvr>
+    <a:masterClrMapping/>
+  </p:clrMapOvr>
+</p:sld>
+</file>
+
+<file path=ppt/slides/slide77.xml><?xml version="1.0" encoding="utf-8"?>
+<p:sld xmlns:a="http://schemas.openxmlformats.org/drawingml/2006/main" xmlns:r="http://schemas.openxmlformats.org/officeDocument/2006/relationships" xmlns:p="http://schemas.openxmlformats.org/presentationml/2006/main">
+  <p:cSld>
+    <p:spTree>
+      <p:nvGrpSpPr>
+        <p:cNvPr id="1" name=""/>
+        <p:cNvGrpSpPr/>
+        <p:nvPr/>
+      </p:nvGrpSpPr>
+      <p:grpSpPr>
+        <a:xfrm>
+          <a:off x="0" y="0"/>
+          <a:ext cx="0" cy="0"/>
+          <a:chOff x="0" y="0"/>
+          <a:chExt cx="0" cy="0"/>
+        </a:xfrm>
+      </p:grpSpPr>
+      <p:sp>
+        <p:nvSpPr>
+          <p:cNvPr id="2" name="Title 1">
+            <a:extLst>
+              <a:ext uri="{FF2B5EF4-FFF2-40B4-BE49-F238E27FC236}">
+                <a16:creationId xmlns:a16="http://schemas.microsoft.com/office/drawing/2014/main" id="{5CA32CAE-C072-3422-F222-D598990D8902}"/>
+              </a:ext>
+            </a:extLst>
+          </p:cNvPr>
+          <p:cNvSpPr>
+            <a:spLocks noGrp="1"/>
+          </p:cNvSpPr>
+          <p:nvPr>
+            <p:ph type="title"/>
+          </p:nvPr>
+        </p:nvSpPr>
+        <p:spPr/>
+        <p:txBody>
+          <a:bodyPr/>
+          <a:lstStyle/>
+          <a:p>
+            <a:r>
+              <a:rPr lang="en-GB" dirty="0"/>
+              <a:t>If time allows, let us define our Tokenizer v1.0</a:t>
+            </a:r>
+            <a:endParaRPr lang="en-SG" dirty="0"/>
+          </a:p>
+        </p:txBody>
+      </p:sp>
+      <p:sp>
+        <p:nvSpPr>
+          <p:cNvPr id="3" name="Content Placeholder 2">
+            <a:extLst>
+              <a:ext uri="{FF2B5EF4-FFF2-40B4-BE49-F238E27FC236}">
+                <a16:creationId xmlns:a16="http://schemas.microsoft.com/office/drawing/2014/main" id="{3E807926-5A85-2B0A-E0A9-3D6A993803D9}"/>
+              </a:ext>
+            </a:extLst>
+          </p:cNvPr>
+          <p:cNvSpPr>
+            <a:spLocks noGrp="1"/>
+          </p:cNvSpPr>
+          <p:nvPr>
+            <p:ph idx="1"/>
+          </p:nvPr>
+        </p:nvSpPr>
+        <p:spPr>
+          <a:xfrm>
+            <a:off x="838200" y="1825624"/>
+            <a:ext cx="10515600" cy="5032375"/>
+          </a:xfrm>
+        </p:spPr>
+        <p:txBody>
+          <a:bodyPr>
+            <a:normAutofit lnSpcReduction="10000"/>
+          </a:bodyPr>
+          <a:lstStyle/>
+          <a:p>
+            <a:pPr marL="0" indent="0">
+              <a:buNone/>
+            </a:pPr>
+            <a:r>
+              <a:rPr lang="en-GB" dirty="0"/>
+              <a:t>Assemble all concepts from earlier to produce a Tokenizer v1.0, which:</a:t>
+            </a:r>
+          </a:p>
+          <a:p>
+            <a:r>
+              <a:rPr lang="en-GB" dirty="0"/>
+              <a:t>Will receive a string “</a:t>
+            </a:r>
+            <a:r>
+              <a:rPr lang="en-GB" dirty="0" err="1"/>
+              <a:t>source.c</a:t>
+            </a:r>
+            <a:r>
+              <a:rPr lang="en-GB" dirty="0"/>
+              <a:t>” to indicate the name of the file to be tokenized.</a:t>
+            </a:r>
+          </a:p>
+          <a:p>
+            <a:r>
+              <a:rPr lang="en-GB" dirty="0"/>
+              <a:t>Will read the code from the file and split it into lexemes assuming whitespaces and \n are used to separate all lexemes in code.</a:t>
+            </a:r>
+          </a:p>
+          <a:p>
+            <a:r>
+              <a:rPr lang="en-SG" dirty="0"/>
+              <a:t>Will classify the lexemes, one at a time, and will assemble create a Token struct for each lexeme, which will contain:</a:t>
+            </a:r>
+          </a:p>
+          <a:p>
+            <a:pPr lvl="1"/>
+            <a:r>
+              <a:rPr lang="en-SG" dirty="0"/>
+              <a:t>The </a:t>
+            </a:r>
+            <a:r>
+              <a:rPr lang="en-SG" dirty="0" err="1"/>
+              <a:t>TokenType</a:t>
+            </a:r>
+            <a:r>
+              <a:rPr lang="en-SG" dirty="0"/>
+              <a:t>,</a:t>
+            </a:r>
+          </a:p>
+          <a:p>
+            <a:pPr lvl="1"/>
+            <a:r>
+              <a:rPr lang="en-SG" dirty="0"/>
+              <a:t>The lexeme.</a:t>
+            </a:r>
+          </a:p>
+          <a:p>
+            <a:r>
+              <a:rPr lang="en-SG" dirty="0"/>
+              <a:t>Eventually, will assemble all Token structs in an array of structs, which we are going to call our </a:t>
+            </a:r>
+            <a:r>
+              <a:rPr lang="en-SG" b="1" dirty="0"/>
+              <a:t>Tokens Stream</a:t>
+            </a:r>
+            <a:r>
+              <a:rPr lang="en-SG" dirty="0"/>
+              <a:t>, and is the output of the Tokenization task.</a:t>
+            </a:r>
+          </a:p>
+        </p:txBody>
+      </p:sp>
+    </p:spTree>
+    <p:extLst>
+      <p:ext uri="{BB962C8B-B14F-4D97-AF65-F5344CB8AC3E}">
+        <p14:creationId xmlns:p14="http://schemas.microsoft.com/office/powerpoint/2010/main" val="2655895668"/>
+      </p:ext>
+    </p:extLst>
+  </p:cSld>
+  <p:clrMapOvr>
+    <a:masterClrMapping/>
+  </p:clrMapOvr>
+</p:sld>
+</file>
+
+<file path=ppt/slides/slide78.xml><?xml version="1.0" encoding="utf-8"?>
+<p:sld xmlns:a="http://schemas.openxmlformats.org/drawingml/2006/main" xmlns:r="http://schemas.openxmlformats.org/officeDocument/2006/relationships" xmlns:p="http://schemas.openxmlformats.org/presentationml/2006/main">
+  <p:cSld>
+    <p:spTree>
+      <p:nvGrpSpPr>
+        <p:cNvPr id="1" name=""/>
+        <p:cNvGrpSpPr/>
+        <p:nvPr/>
+      </p:nvGrpSpPr>
+      <p:grpSpPr>
+        <a:xfrm>
+          <a:off x="0" y="0"/>
+          <a:ext cx="0" cy="0"/>
+          <a:chOff x="0" y="0"/>
+          <a:chExt cx="0" cy="0"/>
+        </a:xfrm>
+      </p:grpSpPr>
+      <p:sp>
+        <p:nvSpPr>
+          <p:cNvPr id="2" name="Title 1">
+            <a:extLst>
+              <a:ext uri="{FF2B5EF4-FFF2-40B4-BE49-F238E27FC236}">
+                <a16:creationId xmlns:a16="http://schemas.microsoft.com/office/drawing/2014/main" id="{5CA32CAE-C072-3422-F222-D598990D8902}"/>
+              </a:ext>
+            </a:extLst>
+          </p:cNvPr>
+          <p:cNvSpPr>
+            <a:spLocks noGrp="1"/>
+          </p:cNvSpPr>
+          <p:nvPr>
+            <p:ph type="title"/>
+          </p:nvPr>
+        </p:nvSpPr>
+        <p:spPr/>
+        <p:txBody>
+          <a:bodyPr/>
+          <a:lstStyle/>
+          <a:p>
+            <a:r>
+              <a:rPr lang="en-GB" dirty="0"/>
+              <a:t>Tokenizer 1.</a:t>
+            </a:r>
+            <a:r>
+              <a:rPr lang="en-GB" dirty="0">
+                <a:solidFill>
+                  <a:srgbClr val="7030A0"/>
+                </a:solidFill>
+              </a:rPr>
+              <a:t>0</a:t>
+            </a:r>
+            <a:r>
+              <a:rPr lang="en-GB" dirty="0"/>
+              <a:t> </a:t>
+            </a:r>
+            <a:r>
+              <a:rPr lang="en-GB" dirty="0">
+                <a:sym typeface="Wingdings" panose="05000000000000000000" pitchFamily="2" charset="2"/>
+              </a:rPr>
+              <a:t> </a:t>
+            </a:r>
+            <a:r>
+              <a:rPr lang="en-GB" dirty="0"/>
+              <a:t>Tokenizer v1.</a:t>
+            </a:r>
+            <a:r>
+              <a:rPr lang="en-GB" dirty="0">
+                <a:solidFill>
+                  <a:srgbClr val="7030A0"/>
+                </a:solidFill>
+              </a:rPr>
+              <a:t>1</a:t>
+            </a:r>
+            <a:endParaRPr lang="en-SG" dirty="0">
+              <a:solidFill>
+                <a:srgbClr val="7030A0"/>
+              </a:solidFill>
+            </a:endParaRPr>
+          </a:p>
+        </p:txBody>
+      </p:sp>
+      <p:sp>
+        <p:nvSpPr>
+          <p:cNvPr id="3" name="Content Placeholder 2">
+            <a:extLst>
+              <a:ext uri="{FF2B5EF4-FFF2-40B4-BE49-F238E27FC236}">
+                <a16:creationId xmlns:a16="http://schemas.microsoft.com/office/drawing/2014/main" id="{3E807926-5A85-2B0A-E0A9-3D6A993803D9}"/>
+              </a:ext>
+            </a:extLst>
+          </p:cNvPr>
+          <p:cNvSpPr>
+            <a:spLocks noGrp="1"/>
+          </p:cNvSpPr>
+          <p:nvPr>
+            <p:ph idx="1"/>
+          </p:nvPr>
+        </p:nvSpPr>
+        <p:spPr>
+          <a:xfrm>
+            <a:off x="838200" y="1825624"/>
+            <a:ext cx="10515600" cy="5032375"/>
+          </a:xfrm>
+        </p:spPr>
+        <p:txBody>
+          <a:bodyPr>
+            <a:normAutofit lnSpcReduction="10000"/>
+          </a:bodyPr>
+          <a:lstStyle/>
+          <a:p>
+            <a:pPr marL="0" indent="0">
+              <a:buNone/>
+            </a:pPr>
+            <a:r>
+              <a:rPr lang="en-GB" dirty="0"/>
+              <a:t>Additional features of Tokenizer v1.1 (for extra challenge):</a:t>
+            </a:r>
+          </a:p>
+          <a:p>
+            <a:pPr marL="514350" indent="-514350">
+              <a:buFont typeface="+mj-lt"/>
+              <a:buAutoNum type="arabicPeriod"/>
+            </a:pPr>
+            <a:r>
+              <a:rPr lang="en-GB" dirty="0"/>
+              <a:t>The Tokenizer should now use more token types.</a:t>
+            </a:r>
+          </a:p>
+          <a:p>
+            <a:pPr marL="971550" lvl="1" indent="-514350">
+              <a:buFont typeface="+mj-lt"/>
+              <a:buAutoNum type="alphaLcPeriod"/>
+            </a:pPr>
+            <a:r>
+              <a:rPr lang="en-GB" dirty="0"/>
+              <a:t>Instead of having a single TOKEN_KEYWORD, it should have more Token types for keywords, such as TOKEN_KEYWORD_WHILE, TOKEN_KEYWORD_IF, etc.</a:t>
+            </a:r>
+          </a:p>
+          <a:p>
+            <a:pPr marL="971550" lvl="1" indent="-514350">
+              <a:buFont typeface="+mj-lt"/>
+              <a:buAutoNum type="alphaLcPeriod"/>
+            </a:pPr>
+            <a:r>
+              <a:rPr lang="en-GB" dirty="0"/>
+              <a:t>Instead of a single TOKEN_OPERATOR, it should have TOKEN_OPERATOR_ADD, TOKEN_OPERATOR_MUL, etc.</a:t>
+            </a:r>
+          </a:p>
+          <a:p>
+            <a:pPr marL="971550" lvl="1" indent="-514350">
+              <a:buFont typeface="+mj-lt"/>
+              <a:buAutoNum type="alphaLcPeriod"/>
+            </a:pPr>
+            <a:r>
+              <a:rPr lang="en-GB" dirty="0"/>
+              <a:t>Instead of a single TOKEN_PUNCTUATION, it should have TOKEN_PUNCT_OPENPAR, TOKEN_PUNCT_SEMICOLON, etc.</a:t>
+            </a:r>
+          </a:p>
+          <a:p>
+            <a:pPr marL="971550" lvl="1" indent="-514350">
+              <a:buFont typeface="+mj-lt"/>
+              <a:buAutoNum type="alphaLcPeriod"/>
+            </a:pPr>
+            <a:r>
+              <a:rPr lang="en-GB" dirty="0"/>
+              <a:t>Instead of a single TOKEN_LITERAL, it should have several possible types of literals such as TOKEN_LITERAL_INT, TOKEN_LITERAL_FLOAT, TOKEN_LITERAL_CHAR, TOKEN_LITERAL_STRING.</a:t>
+            </a:r>
+          </a:p>
+          <a:p>
+            <a:pPr marL="971550" lvl="1" indent="-514350">
+              <a:buFont typeface="+mj-lt"/>
+              <a:buAutoNum type="alphaLcPeriod"/>
+            </a:pPr>
+            <a:r>
+              <a:rPr lang="en-GB" dirty="0"/>
+              <a:t>This last part will probably require to come up with additional functions and </a:t>
+            </a:r>
+            <a:r>
+              <a:rPr lang="en-GB" dirty="0" err="1"/>
+              <a:t>RegEx</a:t>
+            </a:r>
+            <a:r>
+              <a:rPr lang="en-GB" dirty="0"/>
+              <a:t> to recognize new types such </a:t>
+            </a:r>
+            <a:r>
+              <a:rPr lang="en-GB"/>
+              <a:t>as floats, chars and strings.</a:t>
+            </a:r>
+            <a:endParaRPr lang="en-SG" dirty="0"/>
+          </a:p>
+        </p:txBody>
+      </p:sp>
+    </p:spTree>
+    <p:extLst>
+      <p:ext uri="{BB962C8B-B14F-4D97-AF65-F5344CB8AC3E}">
+        <p14:creationId xmlns:p14="http://schemas.microsoft.com/office/powerpoint/2010/main" val="127443025"/>
+      </p:ext>
+    </p:extLst>
+  </p:cSld>
+  <p:clrMapOvr>
+    <a:masterClrMapping/>
+  </p:clrMapOvr>
+</p:sld>
+</file>
+
+<file path=ppt/slides/slide79.xml><?xml version="1.0" encoding="utf-8"?>
+<p:sld xmlns:a="http://schemas.openxmlformats.org/drawingml/2006/main" xmlns:r="http://schemas.openxmlformats.org/officeDocument/2006/relationships" xmlns:p="http://schemas.openxmlformats.org/presentationml/2006/main">
+  <p:cSld>
+    <p:spTree>
+      <p:nvGrpSpPr>
+        <p:cNvPr id="1" name=""/>
+        <p:cNvGrpSpPr/>
+        <p:nvPr/>
+      </p:nvGrpSpPr>
+      <p:grpSpPr>
+        <a:xfrm>
+          <a:off x="0" y="0"/>
+          <a:ext cx="0" cy="0"/>
+          <a:chOff x="0" y="0"/>
+          <a:chExt cx="0" cy="0"/>
+        </a:xfrm>
+      </p:grpSpPr>
+      <p:sp>
+        <p:nvSpPr>
+          <p:cNvPr id="2" name="Title 1">
+            <a:extLst>
+              <a:ext uri="{FF2B5EF4-FFF2-40B4-BE49-F238E27FC236}">
+                <a16:creationId xmlns:a16="http://schemas.microsoft.com/office/drawing/2014/main" id="{5CA32CAE-C072-3422-F222-D598990D8902}"/>
+              </a:ext>
+            </a:extLst>
+          </p:cNvPr>
+          <p:cNvSpPr>
+            <a:spLocks noGrp="1"/>
+          </p:cNvSpPr>
+          <p:nvPr>
+            <p:ph type="title"/>
+          </p:nvPr>
+        </p:nvSpPr>
+        <p:spPr/>
+        <p:txBody>
+          <a:bodyPr/>
+          <a:lstStyle/>
+          <a:p>
+            <a:r>
+              <a:rPr lang="en-GB" dirty="0"/>
+              <a:t>Tokenizer 1.</a:t>
+            </a:r>
+            <a:r>
+              <a:rPr lang="en-GB" dirty="0">
+                <a:solidFill>
+                  <a:srgbClr val="7030A0"/>
+                </a:solidFill>
+              </a:rPr>
+              <a:t>1</a:t>
+            </a:r>
+            <a:r>
+              <a:rPr lang="en-GB" dirty="0"/>
+              <a:t> </a:t>
+            </a:r>
+            <a:r>
+              <a:rPr lang="en-GB" dirty="0">
+                <a:sym typeface="Wingdings" panose="05000000000000000000" pitchFamily="2" charset="2"/>
+              </a:rPr>
+              <a:t> </a:t>
+            </a:r>
+            <a:r>
+              <a:rPr lang="en-GB" dirty="0"/>
+              <a:t>Tokenizer v1.</a:t>
+            </a:r>
+            <a:r>
+              <a:rPr lang="en-GB" dirty="0">
+                <a:solidFill>
+                  <a:srgbClr val="7030A0"/>
+                </a:solidFill>
+              </a:rPr>
+              <a:t>2</a:t>
+            </a:r>
+            <a:endParaRPr lang="en-SG" dirty="0">
+              <a:solidFill>
+                <a:srgbClr val="7030A0"/>
+              </a:solidFill>
+            </a:endParaRPr>
+          </a:p>
+        </p:txBody>
+      </p:sp>
+      <p:sp>
+        <p:nvSpPr>
+          <p:cNvPr id="3" name="Content Placeholder 2">
+            <a:extLst>
+              <a:ext uri="{FF2B5EF4-FFF2-40B4-BE49-F238E27FC236}">
+                <a16:creationId xmlns:a16="http://schemas.microsoft.com/office/drawing/2014/main" id="{3E807926-5A85-2B0A-E0A9-3D6A993803D9}"/>
+              </a:ext>
+            </a:extLst>
+          </p:cNvPr>
+          <p:cNvSpPr>
+            <a:spLocks noGrp="1"/>
+          </p:cNvSpPr>
+          <p:nvPr>
+            <p:ph idx="1"/>
+          </p:nvPr>
+        </p:nvSpPr>
+        <p:spPr>
+          <a:xfrm>
+            <a:off x="838200" y="1825624"/>
+            <a:ext cx="10515600" cy="5032375"/>
+          </a:xfrm>
+        </p:spPr>
+        <p:txBody>
+          <a:bodyPr>
+            <a:normAutofit fontScale="92500" lnSpcReduction="10000"/>
+          </a:bodyPr>
+          <a:lstStyle/>
+          <a:p>
+            <a:pPr marL="0" indent="0">
+              <a:buNone/>
+            </a:pPr>
+            <a:r>
+              <a:rPr lang="en-GB" dirty="0"/>
+              <a:t>Additional features of Tokenizer v1.2 (for extra challenge):</a:t>
+            </a:r>
+          </a:p>
+          <a:p>
+            <a:pPr marL="514350" indent="-514350">
+              <a:buFont typeface="+mj-lt"/>
+              <a:buAutoNum type="arabicPeriod"/>
+            </a:pPr>
+            <a:r>
+              <a:rPr lang="en-GB" dirty="0"/>
+              <a:t>The Token struct should now include a third attribute, of type int, corresponding to the line index on which the lexeme was found in the source code.</a:t>
+            </a:r>
+          </a:p>
+          <a:p>
+            <a:pPr marL="971550" lvl="1" indent="-514350">
+              <a:buFont typeface="+mj-lt"/>
+              <a:buAutoNum type="alphaLcPeriod"/>
+            </a:pPr>
+            <a:r>
+              <a:rPr lang="en-GB" dirty="0"/>
+              <a:t>This will require to rework the string splitting part a bit and using a counter to keep track of the line index at which each lexeme was found.</a:t>
+            </a:r>
+          </a:p>
+          <a:p>
+            <a:pPr marL="971550" lvl="1" indent="-514350">
+              <a:buFont typeface="+mj-lt"/>
+              <a:buAutoNum type="alphaLcPeriod"/>
+            </a:pPr>
+            <a:r>
+              <a:rPr lang="en-GB" dirty="0"/>
+              <a:t>Later on, we will also rework the Token struct definition as well as the constructor and destructor functions to include the </a:t>
+            </a:r>
+            <a:r>
+              <a:rPr lang="en-GB" dirty="0" err="1"/>
+              <a:t>line_number</a:t>
+            </a:r>
+            <a:r>
+              <a:rPr lang="en-GB" dirty="0"/>
+              <a:t> attribute.</a:t>
+            </a:r>
+          </a:p>
+          <a:p>
+            <a:pPr marL="514350" indent="-514350">
+              <a:buFont typeface="+mj-lt"/>
+              <a:buAutoNum type="arabicPeriod"/>
+            </a:pPr>
+            <a:r>
+              <a:rPr lang="en-GB" dirty="0"/>
+              <a:t>Along with the stream of tokens the Tokenizer 1.0 should return a bool with value True if no Tokens of types UNKNOWN appear in the Tokens Stream; and False otherwise.</a:t>
+            </a:r>
+          </a:p>
+          <a:p>
+            <a:pPr marL="514350" indent="-514350">
+              <a:buFont typeface="+mj-lt"/>
+              <a:buAutoNum type="arabicPeriod"/>
+            </a:pPr>
+            <a:r>
+              <a:rPr lang="en-GB" dirty="0"/>
+              <a:t>If a Token of type UNKNOWN appears, there should be an error message showing the problematic lexeme and the line index at which it appears in the source code.</a:t>
+            </a:r>
+            <a:endParaRPr lang="en-SG" dirty="0"/>
+          </a:p>
+        </p:txBody>
+      </p:sp>
+    </p:spTree>
+    <p:extLst>
+      <p:ext uri="{BB962C8B-B14F-4D97-AF65-F5344CB8AC3E}">
+        <p14:creationId xmlns:p14="http://schemas.microsoft.com/office/powerpoint/2010/main" val="2694874023"/>
       </p:ext>
     </p:extLst>
   </p:cSld>

</xml_diff>

<commit_message>
Corrected minor typos on W9S3.
</commit_message>
<xml_diff>
--- a/W9/W9S3/W9S3.pptx
+++ b/W9/W9S3/W9S3.pptx
@@ -351,7 +351,7 @@
   <pc:docChgLst>
     <pc:chgData name="Matthieu De Mari" userId="dfb708c9-d8dc-439f-9a3b-c772bf4a311c" providerId="ADAL" clId="{1888DEAD-E307-4CA6-AFF5-49DFF9FCD3C3}"/>
     <pc:docChg chg="undo redo custSel addSld delSld modSld sldOrd addSection delSection modSection">
-      <pc:chgData name="Matthieu De Mari" userId="dfb708c9-d8dc-439f-9a3b-c772bf4a311c" providerId="ADAL" clId="{1888DEAD-E307-4CA6-AFF5-49DFF9FCD3C3}" dt="2023-03-23T06:04:50.004" v="18554" actId="20577"/>
+      <pc:chgData name="Matthieu De Mari" userId="dfb708c9-d8dc-439f-9a3b-c772bf4a311c" providerId="ADAL" clId="{1888DEAD-E307-4CA6-AFF5-49DFF9FCD3C3}" dt="2023-03-23T09:34:04.206" v="18555" actId="20577"/>
       <pc:docMkLst>
         <pc:docMk/>
       </pc:docMkLst>
@@ -2971,7 +2971,7 @@
         </pc:spChg>
       </pc:sldChg>
       <pc:sldChg chg="modSp new mod">
-        <pc:chgData name="Matthieu De Mari" userId="dfb708c9-d8dc-439f-9a3b-c772bf4a311c" providerId="ADAL" clId="{1888DEAD-E307-4CA6-AFF5-49DFF9FCD3C3}" dt="2023-03-23T05:59:07.378" v="17780" actId="113"/>
+        <pc:chgData name="Matthieu De Mari" userId="dfb708c9-d8dc-439f-9a3b-c772bf4a311c" providerId="ADAL" clId="{1888DEAD-E307-4CA6-AFF5-49DFF9FCD3C3}" dt="2023-03-23T09:34:04.206" v="18555" actId="20577"/>
         <pc:sldMkLst>
           <pc:docMk/>
           <pc:sldMk cId="2655895668" sldId="469"/>
@@ -2985,7 +2985,7 @@
           </ac:spMkLst>
         </pc:spChg>
         <pc:spChg chg="mod">
-          <ac:chgData name="Matthieu De Mari" userId="dfb708c9-d8dc-439f-9a3b-c772bf4a311c" providerId="ADAL" clId="{1888DEAD-E307-4CA6-AFF5-49DFF9FCD3C3}" dt="2023-03-23T05:59:07.378" v="17780" actId="113"/>
+          <ac:chgData name="Matthieu De Mari" userId="dfb708c9-d8dc-439f-9a3b-c772bf4a311c" providerId="ADAL" clId="{1888DEAD-E307-4CA6-AFF5-49DFF9FCD3C3}" dt="2023-03-23T09:34:04.206" v="18555" actId="20577"/>
           <ac:spMkLst>
             <pc:docMk/>
             <pc:sldMk cId="2655895668" sldId="469"/>
@@ -28834,7 +28834,15 @@
           <a:p>
             <a:r>
               <a:rPr lang="en-SG" dirty="0"/>
-              <a:t>Will classify the lexemes, one at a time, and will assemble create a Token struct for each lexeme, which will contain:</a:t>
+              <a:t>Will classify the lexemes, one at a time, and </a:t>
+            </a:r>
+            <a:r>
+              <a:rPr lang="en-SG"/>
+              <a:t>will create </a:t>
+            </a:r>
+            <a:r>
+              <a:rPr lang="en-SG" dirty="0"/>
+              <a:t>a Token struct for each lexeme, which will contain:</a:t>
             </a:r>
           </a:p>
           <a:p>

</xml_diff>